<commit_message>
Slight updates to poster
</commit_message>
<xml_diff>
--- a/15.093_poster_template_resized.pptx
+++ b/15.093_poster_template_resized.pptx
@@ -211,7 +211,7 @@
           <a:p>
             <a:fld id="{890071B7-4BD8-8145-82BE-2A6C42B82778}" type="datetime1">
               <a:rPr lang="en-US" smtClean="0"/>
-              <a:t>12/7/2022</a:t>
+              <a:t>12/8/2022</a:t>
             </a:fld>
             <a:endParaRPr lang="en-US"/>
           </a:p>
@@ -380,7 +380,7 @@
           <a:p>
             <a:fld id="{7391307E-C702-714D-87CE-7789B0B8B84B}" type="datetime1">
               <a:rPr lang="en-US" smtClean="0"/>
-              <a:t>12/7/2022</a:t>
+              <a:t>12/8/2022</a:t>
             </a:fld>
             <a:endParaRPr lang="en-US"/>
           </a:p>
@@ -2841,7 +2841,7 @@
         </p:nvSpPr>
         <p:spPr>
           <a:xfrm>
-            <a:off x="422031" y="1"/>
+            <a:off x="422031" y="0"/>
             <a:ext cx="32074338" cy="21945602"/>
           </a:xfrm>
           <a:prstGeom prst="rect">
@@ -3211,16 +3211,10 @@
           <a:lstStyle/>
           <a:p>
             <a:r>
-              <a:rPr lang="en-US" sz="10900" b="1" dirty="0" err="1">
-                <a:latin typeface="+mj-lt"/>
-              </a:rPr>
-              <a:t>Optimising</a:t>
-            </a:r>
-            <a:r>
               <a:rPr lang="en-US" sz="10900" b="1" dirty="0">
                 <a:latin typeface="+mj-lt"/>
               </a:rPr>
-              <a:t> Football Lineups</a:t>
+              <a:t>Optimizing Football Lineups</a:t>
             </a:r>
           </a:p>
         </p:txBody>
@@ -4142,6 +4136,221 @@
               <a:rPr lang="en-US" sz="4616" dirty="0"/>
               <a:t>Text box</a:t>
             </a:r>
+          </a:p>
+        </p:txBody>
+      </p:sp>
+      <p:sp>
+        <p:nvSpPr>
+          <p:cNvPr id="2" name="TextBox 1">
+            <a:extLst>
+              <a:ext uri="{FF2B5EF4-FFF2-40B4-BE49-F238E27FC236}">
+                <a16:creationId xmlns:a16="http://schemas.microsoft.com/office/drawing/2014/main" id="{A623638A-D9C2-B3EA-D254-AAD089D5CD35}"/>
+              </a:ext>
+            </a:extLst>
+          </p:cNvPr>
+          <p:cNvSpPr txBox="1"/>
+          <p:nvPr/>
+        </p:nvSpPr>
+        <p:spPr>
+          <a:xfrm>
+            <a:off x="11621732" y="4755702"/>
+            <a:ext cx="10100490" cy="4354269"/>
+          </a:xfrm>
+          <a:prstGeom prst="rect">
+            <a:avLst/>
+          </a:prstGeom>
+          <a:noFill/>
+        </p:spPr>
+        <p:txBody>
+          <a:bodyPr wrap="square" rtlCol="0">
+            <a:spAutoFit/>
+          </a:bodyPr>
+          <a:lstStyle/>
+          <a:p>
+            <a:r>
+              <a:rPr lang="en-US" sz="4616" dirty="0"/>
+              <a:t>We obtained player data from FIFA for Liverpool for the 21/22 season, as well as average team data for the other Premier League teams. The data has information, such as the position each player plays in, and their ratings.</a:t>
+            </a:r>
+          </a:p>
+        </p:txBody>
+      </p:sp>
+      <p:sp>
+        <p:nvSpPr>
+          <p:cNvPr id="3" name="TextBox 2">
+            <a:extLst>
+              <a:ext uri="{FF2B5EF4-FFF2-40B4-BE49-F238E27FC236}">
+                <a16:creationId xmlns:a16="http://schemas.microsoft.com/office/drawing/2014/main" id="{9FED5845-45CA-E5FE-1B4D-8D36DD7CC8FC}"/>
+              </a:ext>
+            </a:extLst>
+          </p:cNvPr>
+          <p:cNvSpPr txBox="1"/>
+          <p:nvPr/>
+        </p:nvSpPr>
+        <p:spPr>
+          <a:xfrm>
+            <a:off x="625684" y="14724583"/>
+            <a:ext cx="10807676" cy="3643946"/>
+          </a:xfrm>
+          <a:prstGeom prst="rect">
+            <a:avLst/>
+          </a:prstGeom>
+          <a:noFill/>
+        </p:spPr>
+        <p:txBody>
+          <a:bodyPr wrap="square" rtlCol="0">
+            <a:spAutoFit/>
+          </a:bodyPr>
+          <a:lstStyle/>
+          <a:p>
+            <a:r>
+              <a:rPr lang="en-US" sz="4616" dirty="0"/>
+              <a:t>Football is the most watched sport in the world. As such we want to make sure that we bring the best out of every player, and hence, the best out of our team, in order to give the best experience to our fans.</a:t>
+            </a:r>
+          </a:p>
+        </p:txBody>
+      </p:sp>
+      <p:sp>
+        <p:nvSpPr>
+          <p:cNvPr id="4" name="TextBox 3">
+            <a:extLst>
+              <a:ext uri="{FF2B5EF4-FFF2-40B4-BE49-F238E27FC236}">
+                <a16:creationId xmlns:a16="http://schemas.microsoft.com/office/drawing/2014/main" id="{43E36199-28CF-86AE-EAB8-BF9177FF10B7}"/>
+              </a:ext>
+            </a:extLst>
+          </p:cNvPr>
+          <p:cNvSpPr txBox="1"/>
+          <p:nvPr/>
+        </p:nvSpPr>
+        <p:spPr>
+          <a:xfrm>
+            <a:off x="719040" y="8818986"/>
+            <a:ext cx="10807676" cy="2223301"/>
+          </a:xfrm>
+          <a:prstGeom prst="rect">
+            <a:avLst/>
+          </a:prstGeom>
+          <a:noFill/>
+        </p:spPr>
+        <p:txBody>
+          <a:bodyPr wrap="square" rtlCol="0">
+            <a:spAutoFit/>
+          </a:bodyPr>
+          <a:lstStyle/>
+          <a:p>
+            <a:r>
+              <a:rPr lang="en-US" sz="4616" dirty="0"/>
+              <a:t>Optimizing the lineups of Liverpool over the 38 game season to maximize the number of games that we play to win.</a:t>
+            </a:r>
+          </a:p>
+        </p:txBody>
+      </p:sp>
+      <p:sp>
+        <p:nvSpPr>
+          <p:cNvPr id="6" name="TextBox 5">
+            <a:extLst>
+              <a:ext uri="{FF2B5EF4-FFF2-40B4-BE49-F238E27FC236}">
+                <a16:creationId xmlns:a16="http://schemas.microsoft.com/office/drawing/2014/main" id="{4FBA675A-FFC5-726B-DDC6-F2A9E5AD72AB}"/>
+              </a:ext>
+            </a:extLst>
+          </p:cNvPr>
+          <p:cNvSpPr txBox="1"/>
+          <p:nvPr/>
+        </p:nvSpPr>
+        <p:spPr>
+          <a:xfrm>
+            <a:off x="11614270" y="10265853"/>
+            <a:ext cx="10107952" cy="802656"/>
+          </a:xfrm>
+          <a:prstGeom prst="rect">
+            <a:avLst/>
+          </a:prstGeom>
+          <a:noFill/>
+        </p:spPr>
+        <p:txBody>
+          <a:bodyPr wrap="square" rtlCol="0">
+            <a:spAutoFit/>
+          </a:bodyPr>
+          <a:lstStyle/>
+          <a:p>
+            <a:r>
+              <a:rPr lang="en-US" sz="4616" dirty="0"/>
+              <a:t>LINEUPS!!!</a:t>
+            </a:r>
+          </a:p>
+        </p:txBody>
+      </p:sp>
+      <p:sp>
+        <p:nvSpPr>
+          <p:cNvPr id="7" name="TextBox 6">
+            <a:extLst>
+              <a:ext uri="{FF2B5EF4-FFF2-40B4-BE49-F238E27FC236}">
+                <a16:creationId xmlns:a16="http://schemas.microsoft.com/office/drawing/2014/main" id="{2EB19A8D-1DEA-347C-76ED-300F969DF012}"/>
+              </a:ext>
+            </a:extLst>
+          </p:cNvPr>
+          <p:cNvSpPr txBox="1"/>
+          <p:nvPr/>
+        </p:nvSpPr>
+        <p:spPr>
+          <a:xfrm>
+            <a:off x="21851651" y="4652088"/>
+            <a:ext cx="10107952" cy="1512978"/>
+          </a:xfrm>
+          <a:prstGeom prst="rect">
+            <a:avLst/>
+          </a:prstGeom>
+          <a:noFill/>
+        </p:spPr>
+        <p:txBody>
+          <a:bodyPr wrap="square" rtlCol="0">
+            <a:spAutoFit/>
+          </a:bodyPr>
+          <a:lstStyle/>
+          <a:p>
+            <a:r>
+              <a:rPr lang="en-US" sz="4616" dirty="0"/>
+              <a:t>Comparison with actual lineups and see what differences we can observe</a:t>
+            </a:r>
+          </a:p>
+        </p:txBody>
+      </p:sp>
+      <p:sp>
+        <p:nvSpPr>
+          <p:cNvPr id="9" name="TextBox 8">
+            <a:extLst>
+              <a:ext uri="{FF2B5EF4-FFF2-40B4-BE49-F238E27FC236}">
+                <a16:creationId xmlns:a16="http://schemas.microsoft.com/office/drawing/2014/main" id="{61B9B687-30A0-4635-5B3C-D9A11B5B6189}"/>
+              </a:ext>
+            </a:extLst>
+          </p:cNvPr>
+          <p:cNvSpPr txBox="1"/>
+          <p:nvPr/>
+        </p:nvSpPr>
+        <p:spPr>
+          <a:xfrm>
+            <a:off x="21908610" y="11853220"/>
+            <a:ext cx="10107952" cy="1512978"/>
+          </a:xfrm>
+          <a:prstGeom prst="rect">
+            <a:avLst/>
+          </a:prstGeom>
+          <a:noFill/>
+        </p:spPr>
+        <p:txBody>
+          <a:bodyPr wrap="square" rtlCol="0">
+            <a:spAutoFit/>
+          </a:bodyPr>
+          <a:lstStyle/>
+          <a:p>
+            <a:r>
+              <a:rPr lang="en-US" sz="4616" dirty="0"/>
+              <a:t>Add more constraints to make the model more realistic (such as injury </a:t>
+            </a:r>
+            <a:r>
+              <a:rPr lang="en-US" sz="4616"/>
+              <a:t>stuff)</a:t>
+            </a:r>
+            <a:endParaRPr lang="en-US" sz="4616" dirty="0"/>
           </a:p>
         </p:txBody>
       </p:sp>

</xml_diff>

<commit_message>
Add one more model that gave opposing teams a multiplier
</commit_message>
<xml_diff>
--- a/15.093_poster_template_resized.pptx
+++ b/15.093_poster_template_resized.pptx
@@ -211,7 +211,7 @@
           <a:p>
             <a:fld id="{890071B7-4BD8-8145-82BE-2A6C42B82778}" type="datetime1">
               <a:rPr lang="en-US" smtClean="0"/>
-              <a:t>12/8/2022</a:t>
+              <a:t>12/8/22</a:t>
             </a:fld>
             <a:endParaRPr lang="en-US"/>
           </a:p>
@@ -380,7 +380,7 @@
           <a:p>
             <a:fld id="{7391307E-C702-714D-87CE-7789B0B8B84B}" type="datetime1">
               <a:rPr lang="en-US" smtClean="0"/>
-              <a:t>12/8/2022</a:t>
+              <a:t>12/8/22</a:t>
             </a:fld>
             <a:endParaRPr lang="en-US"/>
           </a:p>
@@ -2841,8 +2841,8 @@
         </p:nvSpPr>
         <p:spPr>
           <a:xfrm>
-            <a:off x="422031" y="0"/>
-            <a:ext cx="32074338" cy="21945602"/>
+            <a:off x="0" y="609600"/>
+            <a:ext cx="32918400" cy="21945600"/>
           </a:xfrm>
           <a:prstGeom prst="rect">
             <a:avLst/>
@@ -2895,7 +2895,7 @@
           <a:lstStyle/>
           <a:p>
             <a:pPr algn="ctr"/>
-            <a:endParaRPr lang="en-US" sz="4388" dirty="0"/>
+            <a:endParaRPr lang="en-US" sz="4400" dirty="0"/>
           </a:p>
         </p:txBody>
       </p:sp>
@@ -3119,7 +3119,7 @@
           </a:lstStyle>
           <a:p>
             <a:r>
-              <a:rPr lang="en-US" sz="9281" dirty="0"/>
+              <a:rPr lang="en-US" sz="4400" dirty="0"/>
               <a:t>15.071—The Analytics Edge 			Fall 2019</a:t>
             </a:r>
           </a:p>
@@ -3174,7 +3174,7 @@
           <a:p>
             <a:pPr algn="ctr" eaLnBrk="1" latinLnBrk="0" hangingPunct="1"/>
             <a:r>
-              <a:rPr lang="en-US" sz="4800" b="1" dirty="0">
+              <a:rPr lang="en-US" sz="4400" b="1" dirty="0">
                 <a:latin typeface="+mj-lt"/>
               </a:rPr>
               <a:t>Executive summary</a:t>
@@ -3197,7 +3197,7 @@
         <p:spPr>
           <a:xfrm>
             <a:off x="1266093" y="292609"/>
-            <a:ext cx="17365785" cy="1754326"/>
+            <a:ext cx="17365785" cy="769441"/>
           </a:xfrm>
           <a:prstGeom prst="rect">
             <a:avLst/>
@@ -3211,7 +3211,7 @@
           <a:lstStyle/>
           <a:p>
             <a:r>
-              <a:rPr lang="en-US" sz="10900" b="1" dirty="0">
+              <a:rPr lang="en-US" sz="4400" b="1" dirty="0">
                 <a:latin typeface="+mj-lt"/>
               </a:rPr>
               <a:t>Optimizing Football Lineups</a:t>
@@ -3248,21 +3248,21 @@
           <a:lstStyle/>
           <a:p>
             <a:r>
-              <a:rPr lang="en-US" sz="4431" b="1" dirty="0"/>
+              <a:rPr lang="en-US" sz="4400" b="1" dirty="0"/>
               <a:t>Muhammad Ashhad Alam (6.7200)</a:t>
             </a:r>
           </a:p>
           <a:p>
             <a:r>
-              <a:rPr lang="en-US" sz="4431" b="1" dirty="0"/>
+              <a:rPr lang="en-US" sz="4400" b="1" dirty="0"/>
               <a:t>Mohammed </a:t>
             </a:r>
             <a:r>
-              <a:rPr lang="en-US" sz="4431" b="1" dirty="0" err="1"/>
+              <a:rPr lang="en-US" sz="4400" b="1" dirty="0" err="1"/>
               <a:t>Isuf</a:t>
             </a:r>
             <a:r>
-              <a:rPr lang="en-US" sz="4431" b="1" dirty="0"/>
+              <a:rPr lang="en-US" sz="4400" b="1" dirty="0"/>
               <a:t> Ahmed (6.7201)</a:t>
             </a:r>
           </a:p>
@@ -3317,7 +3317,7 @@
           <a:p>
             <a:pPr algn="ctr" eaLnBrk="1" latinLnBrk="0" hangingPunct="1"/>
             <a:r>
-              <a:rPr lang="en-US" sz="4800" b="1" dirty="0">
+              <a:rPr lang="en-US" sz="4400" b="1" dirty="0">
                 <a:latin typeface="+mj-lt"/>
               </a:rPr>
               <a:t>Problem statement</a:t>
@@ -3374,7 +3374,7 @@
           <a:p>
             <a:pPr algn="ctr" eaLnBrk="1" latinLnBrk="0" hangingPunct="1"/>
             <a:r>
-              <a:rPr lang="en-US" sz="4800" b="1" dirty="0">
+              <a:rPr lang="en-US" sz="4400" b="1" dirty="0">
                 <a:latin typeface="+mj-lt"/>
               </a:rPr>
               <a:t>Why do we care?</a:t>
@@ -3431,7 +3431,7 @@
           <a:p>
             <a:pPr algn="ctr" eaLnBrk="1" latinLnBrk="0" hangingPunct="1"/>
             <a:r>
-              <a:rPr lang="en-US" sz="4800" b="1" dirty="0">
+              <a:rPr lang="en-US" sz="4400" b="1" dirty="0">
                 <a:latin typeface="+mj-lt"/>
               </a:rPr>
               <a:t>What are the data?</a:t>
@@ -3488,7 +3488,7 @@
           <a:p>
             <a:pPr algn="ctr" eaLnBrk="1" latinLnBrk="0" hangingPunct="1"/>
             <a:r>
-              <a:rPr lang="en-US" sz="4800" b="1" dirty="0">
+              <a:rPr lang="en-US" sz="4400" b="1" dirty="0">
                 <a:latin typeface="+mj-lt"/>
               </a:rPr>
               <a:t>What are the key findings?</a:t>
@@ -3547,7 +3547,7 @@
           <a:p>
             <a:pPr algn="ctr"/>
             <a:r>
-              <a:rPr lang="en-US" sz="4388" dirty="0"/>
+              <a:rPr lang="en-US" sz="4400" dirty="0"/>
               <a:t> </a:t>
             </a:r>
           </a:p>
@@ -3603,7 +3603,7 @@
           <a:lstStyle/>
           <a:p>
             <a:pPr algn="ctr" eaLnBrk="1" latinLnBrk="0" hangingPunct="1"/>
-            <a:endParaRPr lang="en-US" sz="13824" dirty="0"/>
+            <a:endParaRPr lang="en-US" sz="4400" dirty="0"/>
           </a:p>
         </p:txBody>
       </p:sp>
@@ -3658,7 +3658,7 @@
           <a:lstStyle/>
           <a:p>
             <a:pPr algn="ctr" eaLnBrk="1" latinLnBrk="0" hangingPunct="1"/>
-            <a:endParaRPr lang="en-US" sz="13824" dirty="0"/>
+            <a:endParaRPr lang="en-US" sz="4400" dirty="0"/>
           </a:p>
         </p:txBody>
       </p:sp>
@@ -3885,7 +3885,7 @@
               <a:defRPr/>
             </a:pPr>
             <a:r>
-              <a:rPr lang="en-US" sz="6646" dirty="0"/>
+              <a:rPr lang="en-US" sz="4400" dirty="0"/>
               <a:t>15.093—Optimization		                                        Fall 2022</a:t>
             </a:r>
           </a:p>
@@ -4028,7 +4028,7 @@
           <a:p>
             <a:pPr algn="ctr" eaLnBrk="1" latinLnBrk="0" hangingPunct="1"/>
             <a:r>
-              <a:rPr lang="en-US" sz="4800" b="1" dirty="0">
+              <a:rPr lang="en-US" sz="4400" b="1" dirty="0">
                 <a:latin typeface="+mj-lt"/>
               </a:rPr>
               <a:t>What is the impact?</a:t>
@@ -4085,18 +4085,18 @@
           <a:p>
             <a:pPr algn="ctr" eaLnBrk="1" latinLnBrk="0" hangingPunct="1"/>
             <a:r>
-              <a:rPr lang="en-US" sz="4800" b="1" dirty="0">
+              <a:rPr lang="en-US" sz="4400" b="1" dirty="0">
                 <a:latin typeface="+mj-lt"/>
               </a:rPr>
               <a:t>If you had another week,</a:t>
             </a:r>
             <a:br>
-              <a:rPr lang="en-US" sz="4800" b="1" dirty="0">
+              <a:rPr lang="en-US" sz="4400" b="1" dirty="0">
                 <a:latin typeface="+mj-lt"/>
               </a:rPr>
             </a:br>
             <a:r>
-              <a:rPr lang="en-US" sz="4800" b="1" dirty="0">
+              <a:rPr lang="en-US" sz="4400" b="1" dirty="0">
                 <a:latin typeface="+mj-lt"/>
               </a:rPr>
               <a:t>what would you do?</a:t>
@@ -4119,7 +4119,7 @@
         <p:spPr>
           <a:xfrm>
             <a:off x="830241" y="4709535"/>
-            <a:ext cx="10628729" cy="802656"/>
+            <a:ext cx="10628729" cy="2123658"/>
           </a:xfrm>
           <a:prstGeom prst="rect">
             <a:avLst/>
@@ -4133,8 +4133,8 @@
           <a:lstStyle/>
           <a:p>
             <a:r>
-              <a:rPr lang="en-US" sz="4616" dirty="0"/>
-              <a:t>Text box</a:t>
+              <a:rPr lang="en-US" sz="4400" dirty="0"/>
+              <a:t>We found the optimal line up Liverpool should play for every Premier League game in the 21/22 season.</a:t>
             </a:r>
           </a:p>
         </p:txBody>
@@ -4154,7 +4154,7 @@
         <p:spPr>
           <a:xfrm>
             <a:off x="11621732" y="4755702"/>
-            <a:ext cx="10100490" cy="4354269"/>
+            <a:ext cx="10100490" cy="4154984"/>
           </a:xfrm>
           <a:prstGeom prst="rect">
             <a:avLst/>
@@ -4168,8 +4168,8 @@
           <a:lstStyle/>
           <a:p>
             <a:r>
-              <a:rPr lang="en-US" sz="4616" dirty="0"/>
-              <a:t>We obtained player data from FIFA for Liverpool for the 21/22 season, as well as average team data for the other Premier League teams. The data has information, such as the position each player plays in, and their ratings.</a:t>
+              <a:rPr lang="en-US" sz="4400" dirty="0"/>
+              <a:t>We obtained player data from FIFA for Liverpool for the 21/22 season, as well as average team rating for the other Premier League teams. The data has information such as what a player’s potential rating would be in every single position.</a:t>
             </a:r>
           </a:p>
         </p:txBody>
@@ -4189,7 +4189,7 @@
         <p:spPr>
           <a:xfrm>
             <a:off x="625684" y="14724583"/>
-            <a:ext cx="10807676" cy="3643946"/>
+            <a:ext cx="10807676" cy="4832092"/>
           </a:xfrm>
           <a:prstGeom prst="rect">
             <a:avLst/>
@@ -4203,8 +4203,8 @@
           <a:lstStyle/>
           <a:p>
             <a:r>
-              <a:rPr lang="en-US" sz="4616" dirty="0"/>
-              <a:t>Football is the most watched sport in the world. As such we want to make sure that we bring the best out of every player, and hence, the best out of our team, in order to give the best experience to our fans.</a:t>
+              <a:rPr lang="en-US" sz="4400" dirty="0"/>
+              <a:t>Football is the most watched sport in the world. We wanted to see if we could enhance our own experience and discussions by creating a model that could create the optimal line up for every Premier League game based on data and see how it compares to real life where decisions are potentially not so data driven.</a:t>
             </a:r>
           </a:p>
         </p:txBody>
@@ -4224,7 +4224,7 @@
         <p:spPr>
           <a:xfrm>
             <a:off x="719040" y="8818986"/>
-            <a:ext cx="10807676" cy="2223301"/>
+            <a:ext cx="10807676" cy="2123658"/>
           </a:xfrm>
           <a:prstGeom prst="rect">
             <a:avLst/>
@@ -4238,8 +4238,8 @@
           <a:lstStyle/>
           <a:p>
             <a:r>
-              <a:rPr lang="en-US" sz="4616" dirty="0"/>
-              <a:t>Optimizing the lineups of Liverpool over the 38 game season to maximize the number of games that we play to win.</a:t>
+              <a:rPr lang="en-US" sz="4400" dirty="0"/>
+              <a:t>Optimize the lineup and formation for each game in the 21/22 Premier League season for Liverpool FC.</a:t>
             </a:r>
           </a:p>
         </p:txBody>
@@ -4259,7 +4259,7 @@
         <p:spPr>
           <a:xfrm>
             <a:off x="11614270" y="10265853"/>
-            <a:ext cx="10107952" cy="802656"/>
+            <a:ext cx="10107952" cy="769441"/>
           </a:xfrm>
           <a:prstGeom prst="rect">
             <a:avLst/>
@@ -4272,9 +4272,14 @@
           </a:bodyPr>
           <a:lstStyle/>
           <a:p>
-            <a:r>
-              <a:rPr lang="en-US" sz="4616" dirty="0"/>
-              <a:t>LINEUPS!!!</a:t>
+            <a:pPr algn="ctr"/>
+            <a:r>
+              <a:rPr lang="en-US" sz="4400" dirty="0" err="1"/>
+              <a:t>Matchweek</a:t>
+            </a:r>
+            <a:r>
+              <a:rPr lang="en-US" sz="4400" dirty="0"/>
+              <a:t> 36</a:t>
             </a:r>
           </a:p>
         </p:txBody>
@@ -4294,7 +4299,7 @@
         <p:spPr>
           <a:xfrm>
             <a:off x="21851651" y="4652088"/>
-            <a:ext cx="10107952" cy="1512978"/>
+            <a:ext cx="10107952" cy="4154984"/>
           </a:xfrm>
           <a:prstGeom prst="rect">
             <a:avLst/>
@@ -4308,8 +4313,8 @@
           <a:lstStyle/>
           <a:p>
             <a:r>
-              <a:rPr lang="en-US" sz="4616" dirty="0"/>
-              <a:t>Comparison with actual lineups and see what differences we can observe</a:t>
+              <a:rPr lang="en-US" sz="4400" dirty="0"/>
+              <a:t>We can observe how the line ups and formations change based on a pessimistic or optimistic view of the season, on how harsh a penalty we apply, on how many players we allow into the squad, on how many games we allow some players to play etc.</a:t>
             </a:r>
           </a:p>
         </p:txBody>
@@ -4329,7 +4334,7 @@
         <p:spPr>
           <a:xfrm>
             <a:off x="21908610" y="11853220"/>
-            <a:ext cx="10107952" cy="1512978"/>
+            <a:ext cx="10107952" cy="6186309"/>
           </a:xfrm>
           <a:prstGeom prst="rect">
             <a:avLst/>
@@ -4343,14 +4348,289 @@
           <a:lstStyle/>
           <a:p>
             <a:r>
-              <a:rPr lang="en-US" sz="4616" dirty="0"/>
-              <a:t>Add more constraints to make the model more realistic (such as injury </a:t>
-            </a:r>
-            <a:r>
-              <a:rPr lang="en-US" sz="4616"/>
-              <a:t>stuff)</a:t>
-            </a:r>
-            <a:endParaRPr lang="en-US" sz="4616" dirty="0"/>
+              <a:rPr lang="en-US" sz="4400" dirty="0"/>
+              <a:t>Add injury constraints. </a:t>
+            </a:r>
+          </a:p>
+          <a:p>
+            <a:r>
+              <a:rPr lang="en-US" sz="4400" dirty="0"/>
+              <a:t>Allow for transfers for the January transfer window.</a:t>
+            </a:r>
+          </a:p>
+          <a:p>
+            <a:r>
+              <a:rPr lang="en-US" sz="4400" dirty="0"/>
+              <a:t>Incorporate other games.</a:t>
+            </a:r>
+          </a:p>
+          <a:p>
+            <a:r>
+              <a:rPr lang="en-US" sz="4400" dirty="0"/>
+              <a:t>Implement a ML model to determine whether our optimal line up would win each given game.</a:t>
+            </a:r>
+          </a:p>
+          <a:p>
+            <a:r>
+              <a:rPr lang="en-US" sz="4400" dirty="0"/>
+              <a:t>Add a chemistry factor.</a:t>
+            </a:r>
+          </a:p>
+          <a:p>
+            <a:r>
+              <a:rPr lang="en-US" sz="4400" dirty="0"/>
+              <a:t>Add a significance factor.</a:t>
+            </a:r>
+          </a:p>
+        </p:txBody>
+      </p:sp>
+      <p:sp>
+        <p:nvSpPr>
+          <p:cNvPr id="10" name="TextBox 9">
+            <a:extLst>
+              <a:ext uri="{FF2B5EF4-FFF2-40B4-BE49-F238E27FC236}">
+                <a16:creationId xmlns:a16="http://schemas.microsoft.com/office/drawing/2014/main" id="{FAB928A0-062F-DF43-07A9-A409DC70BDCC}"/>
+              </a:ext>
+            </a:extLst>
+          </p:cNvPr>
+          <p:cNvSpPr txBox="1"/>
+          <p:nvPr/>
+        </p:nvSpPr>
+        <p:spPr>
+          <a:xfrm>
+            <a:off x="11652656" y="11291774"/>
+            <a:ext cx="4806520" cy="7294305"/>
+          </a:xfrm>
+          <a:prstGeom prst="rect">
+            <a:avLst/>
+          </a:prstGeom>
+          <a:noFill/>
+        </p:spPr>
+        <p:txBody>
+          <a:bodyPr wrap="square" rtlCol="0">
+            <a:spAutoFit/>
+          </a:bodyPr>
+          <a:lstStyle/>
+          <a:p>
+            <a:r>
+              <a:rPr lang="en-US" sz="3600" dirty="0"/>
+              <a:t>Optimal Line Up</a:t>
+            </a:r>
+          </a:p>
+          <a:p>
+            <a:endParaRPr lang="en-US" sz="3600" dirty="0"/>
+          </a:p>
+          <a:p>
+            <a:r>
+              <a:rPr lang="en-US" sz="3600" dirty="0"/>
+              <a:t>GK: Alisson</a:t>
+            </a:r>
+            <a:br>
+              <a:rPr lang="en-US" sz="3600" dirty="0"/>
+            </a:br>
+            <a:r>
+              <a:rPr lang="en-US" sz="3600" dirty="0"/>
+              <a:t>LB: </a:t>
+            </a:r>
+            <a:r>
+              <a:rPr lang="en-US" sz="3600" dirty="0" err="1"/>
+              <a:t>Roberston</a:t>
+            </a:r>
+            <a:br>
+              <a:rPr lang="en-US" sz="3600" dirty="0"/>
+            </a:br>
+            <a:r>
+              <a:rPr lang="en-US" sz="3600" dirty="0"/>
+              <a:t>CB: Matip</a:t>
+            </a:r>
+          </a:p>
+          <a:p>
+            <a:r>
+              <a:rPr lang="en-US" sz="3600" dirty="0"/>
+              <a:t>CB: </a:t>
+            </a:r>
+            <a:r>
+              <a:rPr lang="en-US" sz="3600" dirty="0" err="1"/>
+              <a:t>Konate</a:t>
+            </a:r>
+            <a:br>
+              <a:rPr lang="en-US" sz="3600" dirty="0"/>
+            </a:br>
+            <a:r>
+              <a:rPr lang="en-US" sz="3600" dirty="0"/>
+              <a:t>RB: TAA</a:t>
+            </a:r>
+            <a:br>
+              <a:rPr lang="en-US" sz="3600" dirty="0"/>
+            </a:br>
+            <a:r>
+              <a:rPr lang="en-US" sz="3600" dirty="0"/>
+              <a:t>CDM: Henderson</a:t>
+            </a:r>
+            <a:br>
+              <a:rPr lang="en-US" sz="3600" dirty="0"/>
+            </a:br>
+            <a:r>
+              <a:rPr lang="en-US" sz="3600" dirty="0"/>
+              <a:t>CM: Thiago</a:t>
+            </a:r>
+            <a:br>
+              <a:rPr lang="en-US" sz="3600" dirty="0"/>
+            </a:br>
+            <a:r>
+              <a:rPr lang="en-US" sz="3600" dirty="0"/>
+              <a:t>CM: Milner</a:t>
+            </a:r>
+            <a:br>
+              <a:rPr lang="en-US" sz="3600" dirty="0"/>
+            </a:br>
+            <a:r>
+              <a:rPr lang="en-US" sz="3600" dirty="0"/>
+              <a:t>LW: Mane</a:t>
+            </a:r>
+            <a:br>
+              <a:rPr lang="en-US" sz="3600" dirty="0"/>
+            </a:br>
+            <a:r>
+              <a:rPr lang="en-US" sz="3600" dirty="0"/>
+              <a:t>RW: Salah</a:t>
+            </a:r>
+            <a:br>
+              <a:rPr lang="en-US" sz="3600" dirty="0"/>
+            </a:br>
+            <a:r>
+              <a:rPr lang="en-US" sz="3600" dirty="0"/>
+              <a:t>ST: Jota</a:t>
+            </a:r>
+          </a:p>
+        </p:txBody>
+      </p:sp>
+      <p:sp>
+        <p:nvSpPr>
+          <p:cNvPr id="11" name="TextBox 10">
+            <a:extLst>
+              <a:ext uri="{FF2B5EF4-FFF2-40B4-BE49-F238E27FC236}">
+                <a16:creationId xmlns:a16="http://schemas.microsoft.com/office/drawing/2014/main" id="{04294F90-2564-BB8F-272A-6B206547BA15}"/>
+              </a:ext>
+            </a:extLst>
+          </p:cNvPr>
+          <p:cNvSpPr txBox="1"/>
+          <p:nvPr/>
+        </p:nvSpPr>
+        <p:spPr>
+          <a:xfrm>
+            <a:off x="16459176" y="11409581"/>
+            <a:ext cx="5228785" cy="7848302"/>
+          </a:xfrm>
+          <a:prstGeom prst="rect">
+            <a:avLst/>
+          </a:prstGeom>
+          <a:noFill/>
+        </p:spPr>
+        <p:txBody>
+          <a:bodyPr wrap="square" rtlCol="0">
+            <a:spAutoFit/>
+          </a:bodyPr>
+          <a:lstStyle/>
+          <a:p>
+            <a:r>
+              <a:rPr lang="en-US" sz="3600" dirty="0"/>
+              <a:t>Real Life Line up</a:t>
+            </a:r>
+          </a:p>
+          <a:p>
+            <a:endParaRPr lang="en-US" sz="3600" dirty="0"/>
+          </a:p>
+          <a:p>
+            <a:r>
+              <a:rPr lang="en-US" sz="3600" dirty="0"/>
+              <a:t>GK: Alisson</a:t>
+            </a:r>
+            <a:br>
+              <a:rPr lang="en-US" sz="3600" dirty="0"/>
+            </a:br>
+            <a:r>
+              <a:rPr lang="en-US" sz="3600" dirty="0"/>
+              <a:t>LB: Robertson</a:t>
+            </a:r>
+            <a:br>
+              <a:rPr lang="en-US" sz="3600" dirty="0"/>
+            </a:br>
+            <a:r>
+              <a:rPr lang="en-US" sz="3600" dirty="0"/>
+              <a:t>CB: VVD</a:t>
+            </a:r>
+          </a:p>
+          <a:p>
+            <a:r>
+              <a:rPr lang="en-US" sz="3600" dirty="0"/>
+              <a:t>CB: </a:t>
+            </a:r>
+            <a:r>
+              <a:rPr lang="en-US" sz="3600" dirty="0" err="1"/>
+              <a:t>Konate</a:t>
+            </a:r>
+            <a:br>
+              <a:rPr lang="en-US" sz="3600" dirty="0"/>
+            </a:br>
+            <a:r>
+              <a:rPr lang="en-US" sz="3600" dirty="0"/>
+              <a:t>RB: TAA</a:t>
+            </a:r>
+            <a:br>
+              <a:rPr lang="en-US" sz="3600" dirty="0"/>
+            </a:br>
+            <a:r>
+              <a:rPr lang="en-US" sz="3600" dirty="0"/>
+              <a:t>CDM: </a:t>
+            </a:r>
+            <a:r>
+              <a:rPr lang="en-US" sz="3600" dirty="0" err="1"/>
+              <a:t>Fabinho</a:t>
+            </a:r>
+            <a:br>
+              <a:rPr lang="en-US" sz="3600" dirty="0"/>
+            </a:br>
+            <a:r>
+              <a:rPr lang="en-US" sz="3600" dirty="0"/>
+              <a:t>CM: Thiago</a:t>
+            </a:r>
+            <a:br>
+              <a:rPr lang="en-US" sz="3600" dirty="0"/>
+            </a:br>
+            <a:r>
+              <a:rPr lang="en-US" sz="3600" dirty="0"/>
+              <a:t>CM: Henderson</a:t>
+            </a:r>
+            <a:br>
+              <a:rPr lang="en-US" sz="3600" dirty="0"/>
+            </a:br>
+            <a:r>
+              <a:rPr lang="en-US" sz="3600" dirty="0"/>
+              <a:t>LW: Mane</a:t>
+            </a:r>
+            <a:br>
+              <a:rPr lang="en-US" sz="3600" dirty="0"/>
+            </a:br>
+            <a:r>
+              <a:rPr lang="en-US" sz="3600" dirty="0"/>
+              <a:t>RW</a:t>
+            </a:r>
+            <a:r>
+              <a:rPr lang="en-US" sz="3600"/>
+              <a:t>: Salah</a:t>
+            </a:r>
+            <a:br>
+              <a:rPr lang="en-US" sz="3600" dirty="0"/>
+            </a:br>
+            <a:r>
+              <a:rPr lang="en-US" sz="3600"/>
+              <a:t>ST: Jota</a:t>
+            </a:r>
+            <a:endParaRPr lang="en-US" sz="3600" dirty="0"/>
+          </a:p>
+          <a:p>
+            <a:endParaRPr lang="en-US" sz="3600" dirty="0"/>
           </a:p>
         </p:txBody>
       </p:sp>

</xml_diff>